<commit_message>
Second Commit Adding characters
</commit_message>
<xml_diff>
--- a/Characters.pptx
+++ b/Characters.pptx
@@ -8,6 +8,7 @@
     <p:sldId id="256" r:id="rId2"/>
     <p:sldId id="257" r:id="rId3"/>
     <p:sldId id="258" r:id="rId4"/>
+    <p:sldId id="259" r:id="rId5"/>
   </p:sldIdLst>
   <p:sldSz cx="12192000" cy="6858000"/>
   <p:notesSz cx="6858000" cy="9144000"/>
@@ -106,6 +107,11 @@
       </a:defRPr>
     </a:lvl9pPr>
   </p:defaultTextStyle>
+  <p:extLst>
+    <p:ext uri="{EFAFB233-063F-42B5-8137-9DF3F51BA10A}">
+      <p15:sldGuideLst xmlns:p15="http://schemas.microsoft.com/office/powerpoint/2012/main"/>
+    </p:ext>
+  </p:extLst>
 </p:presentation>
 </file>
 
@@ -3146,35 +3152,314 @@
           <a:p>
             <a:r>
               <a:rPr lang="en-IN" dirty="0" smtClean="0"/>
-              <a:t>Raccoon</a:t>
+              <a:t>Raccoon: Walking</a:t>
             </a:r>
             <a:endParaRPr lang="en-US" dirty="0"/>
           </a:p>
         </p:txBody>
       </p:sp>
-      <p:sp>
-        <p:nvSpPr>
-          <p:cNvPr id="3" name="Content Placeholder 2"/>
-          <p:cNvSpPr>
-            <a:spLocks noGrp="1"/>
-          </p:cNvSpPr>
+      <p:pic>
+        <p:nvPicPr>
+          <p:cNvPr id="4" name="Content Placeholder 3"/>
+          <p:cNvPicPr>
+            <a:picLocks noGrp="1" noChangeAspect="1"/>
+          </p:cNvPicPr>
           <p:nvPr>
             <p:ph idx="1"/>
           </p:nvPr>
-        </p:nvSpPr>
-        <p:spPr/>
-        <p:txBody>
-          <a:bodyPr/>
-          <a:lstStyle/>
-          <a:p>
-            <a:endParaRPr lang="en-US"/>
-          </a:p>
-        </p:txBody>
-      </p:sp>
+        </p:nvPicPr>
+        <p:blipFill rotWithShape="1">
+          <a:blip r:embed="rId2">
+            <a:extLst>
+              <a:ext uri="{28A0092B-C50C-407E-A947-70E740481C1C}">
+                <a14:useLocalDpi xmlns:a14="http://schemas.microsoft.com/office/drawing/2010/main" val="0"/>
+              </a:ext>
+            </a:extLst>
+          </a:blip>
+          <a:srcRect l="12500" r="12500"/>
+          <a:stretch/>
+        </p:blipFill>
+        <p:spPr>
+          <a:xfrm>
+            <a:off x="81575" y="1506447"/>
+            <a:ext cx="3600000" cy="3600000"/>
+          </a:xfrm>
+        </p:spPr>
+      </p:pic>
+      <p:pic>
+        <p:nvPicPr>
+          <p:cNvPr id="5" name="Picture 4"/>
+          <p:cNvPicPr>
+            <a:picLocks noChangeAspect="1"/>
+          </p:cNvPicPr>
+          <p:nvPr/>
+        </p:nvPicPr>
+        <p:blipFill rotWithShape="1">
+          <a:blip r:embed="rId3">
+            <a:extLst>
+              <a:ext uri="{28A0092B-C50C-407E-A947-70E740481C1C}">
+                <a14:useLocalDpi xmlns:a14="http://schemas.microsoft.com/office/drawing/2010/main" val="0"/>
+              </a:ext>
+            </a:extLst>
+          </a:blip>
+          <a:srcRect l="19005" t="14465" r="24923" b="10772"/>
+          <a:stretch/>
+        </p:blipFill>
+        <p:spPr>
+          <a:xfrm>
+            <a:off x="3925018" y="2027207"/>
+            <a:ext cx="2691441" cy="2691441"/>
+          </a:xfrm>
+          <a:prstGeom prst="rect">
+            <a:avLst/>
+          </a:prstGeom>
+        </p:spPr>
+      </p:pic>
+      <p:pic>
+        <p:nvPicPr>
+          <p:cNvPr id="6" name="Content Placeholder 3"/>
+          <p:cNvPicPr>
+            <a:picLocks noChangeAspect="1"/>
+          </p:cNvPicPr>
+          <p:nvPr/>
+        </p:nvPicPr>
+        <p:blipFill rotWithShape="1">
+          <a:blip r:embed="rId2">
+            <a:extLst>
+              <a:ext uri="{28A0092B-C50C-407E-A947-70E740481C1C}">
+                <a14:useLocalDpi xmlns:a14="http://schemas.microsoft.com/office/drawing/2010/main" val="0"/>
+              </a:ext>
+            </a:extLst>
+          </a:blip>
+          <a:srcRect l="12500" r="12500"/>
+          <a:stretch/>
+        </p:blipFill>
+        <p:spPr>
+          <a:xfrm>
+            <a:off x="7281757" y="1506447"/>
+            <a:ext cx="3600000" cy="3600000"/>
+          </a:xfrm>
+          <a:prstGeom prst="rect">
+            <a:avLst/>
+          </a:prstGeom>
+        </p:spPr>
+      </p:pic>
     </p:spTree>
     <p:extLst>
       <p:ext uri="{BB962C8B-B14F-4D97-AF65-F5344CB8AC3E}">
         <p14:creationId xmlns:p14="http://schemas.microsoft.com/office/powerpoint/2010/main" val="396098762"/>
+      </p:ext>
+    </p:extLst>
+  </p:cSld>
+  <p:clrMapOvr>
+    <a:masterClrMapping/>
+  </p:clrMapOvr>
+</p:sld>
+</file>
+
+<file path=ppt/slides/slide4.xml><?xml version="1.0" encoding="utf-8"?>
+<p:sld xmlns:a="http://schemas.openxmlformats.org/drawingml/2006/main" xmlns:r="http://schemas.openxmlformats.org/officeDocument/2006/relationships" xmlns:p="http://schemas.openxmlformats.org/presentationml/2006/main">
+  <p:cSld>
+    <p:spTree>
+      <p:nvGrpSpPr>
+        <p:cNvPr id="1" name=""/>
+        <p:cNvGrpSpPr/>
+        <p:nvPr/>
+      </p:nvGrpSpPr>
+      <p:grpSpPr>
+        <a:xfrm>
+          <a:off x="0" y="0"/>
+          <a:ext cx="0" cy="0"/>
+          <a:chOff x="0" y="0"/>
+          <a:chExt cx="0" cy="0"/>
+        </a:xfrm>
+      </p:grpSpPr>
+      <p:sp>
+        <p:nvSpPr>
+          <p:cNvPr id="2" name="Title 1"/>
+          <p:cNvSpPr>
+            <a:spLocks noGrp="1"/>
+          </p:cNvSpPr>
+          <p:nvPr>
+            <p:ph type="title"/>
+          </p:nvPr>
+        </p:nvSpPr>
+        <p:spPr/>
+        <p:txBody>
+          <a:bodyPr/>
+          <a:lstStyle/>
+          <a:p>
+            <a:r>
+              <a:rPr lang="en-IN" dirty="0" smtClean="0"/>
+              <a:t>Raccoon: Jumping</a:t>
+            </a:r>
+            <a:endParaRPr lang="en-US" dirty="0"/>
+          </a:p>
+        </p:txBody>
+      </p:sp>
+      <p:pic>
+        <p:nvPicPr>
+          <p:cNvPr id="4" name="Content Placeholder 3"/>
+          <p:cNvPicPr>
+            <a:picLocks noGrp="1" noChangeAspect="1"/>
+          </p:cNvPicPr>
+          <p:nvPr>
+            <p:ph idx="1"/>
+          </p:nvPr>
+        </p:nvPicPr>
+        <p:blipFill rotWithShape="1">
+          <a:blip r:embed="rId2">
+            <a:extLst>
+              <a:ext uri="{28A0092B-C50C-407E-A947-70E740481C1C}">
+                <a14:useLocalDpi xmlns:a14="http://schemas.microsoft.com/office/drawing/2010/main" val="0"/>
+              </a:ext>
+            </a:extLst>
+          </a:blip>
+          <a:srcRect l="20595" t="14887" r="23243" b="10233"/>
+          <a:stretch/>
+        </p:blipFill>
+        <p:spPr>
+          <a:xfrm>
+            <a:off x="539150" y="3526046"/>
+            <a:ext cx="2695756" cy="2695756"/>
+          </a:xfrm>
+        </p:spPr>
+      </p:pic>
+      <p:pic>
+        <p:nvPicPr>
+          <p:cNvPr id="6" name="Content Placeholder 3"/>
+          <p:cNvPicPr>
+            <a:picLocks noChangeAspect="1"/>
+          </p:cNvPicPr>
+          <p:nvPr/>
+        </p:nvPicPr>
+        <p:blipFill rotWithShape="1">
+          <a:blip r:embed="rId2">
+            <a:extLst>
+              <a:ext uri="{28A0092B-C50C-407E-A947-70E740481C1C}">
+                <a14:useLocalDpi xmlns:a14="http://schemas.microsoft.com/office/drawing/2010/main" val="0"/>
+              </a:ext>
+            </a:extLst>
+          </a:blip>
+          <a:srcRect l="12500" r="12500"/>
+          <a:stretch/>
+        </p:blipFill>
+        <p:spPr>
+          <a:xfrm>
+            <a:off x="7920112" y="2938432"/>
+            <a:ext cx="3600000" cy="3600000"/>
+          </a:xfrm>
+          <a:prstGeom prst="rect">
+            <a:avLst/>
+          </a:prstGeom>
+        </p:spPr>
+      </p:pic>
+      <p:grpSp>
+        <p:nvGrpSpPr>
+          <p:cNvPr id="3" name="Group 2"/>
+          <p:cNvGrpSpPr/>
+          <p:nvPr/>
+        </p:nvGrpSpPr>
+        <p:grpSpPr>
+          <a:xfrm>
+            <a:off x="9159575" y="-388921"/>
+            <a:ext cx="3600000" cy="3208084"/>
+            <a:chOff x="3906089" y="1474385"/>
+            <a:chExt cx="3600000" cy="3208084"/>
+          </a:xfrm>
+        </p:grpSpPr>
+        <p:pic>
+          <p:nvPicPr>
+            <p:cNvPr id="5" name="Picture 4"/>
+            <p:cNvPicPr>
+              <a:picLocks noChangeAspect="1"/>
+            </p:cNvPicPr>
+            <p:nvPr/>
+          </p:nvPicPr>
+          <p:blipFill rotWithShape="1">
+            <a:blip r:embed="rId3">
+              <a:extLst>
+                <a:ext uri="{28A0092B-C50C-407E-A947-70E740481C1C}">
+                  <a14:useLocalDpi xmlns:a14="http://schemas.microsoft.com/office/drawing/2010/main" val="0"/>
+                </a:ext>
+              </a:extLst>
+            </a:blip>
+            <a:srcRect l="12500" r="12500" b="25629"/>
+            <a:stretch/>
+          </p:blipFill>
+          <p:spPr>
+            <a:xfrm rot="965540">
+              <a:off x="3906089" y="1474385"/>
+              <a:ext cx="3600000" cy="2677364"/>
+            </a:xfrm>
+            <a:prstGeom prst="rect">
+              <a:avLst/>
+            </a:prstGeom>
+          </p:spPr>
+        </p:pic>
+        <p:pic>
+          <p:nvPicPr>
+            <p:cNvPr id="7" name="Picture 6"/>
+            <p:cNvPicPr>
+              <a:picLocks noChangeAspect="1"/>
+            </p:cNvPicPr>
+            <p:nvPr/>
+          </p:nvPicPr>
+          <p:blipFill rotWithShape="1">
+            <a:blip r:embed="rId3">
+              <a:extLst>
+                <a:ext uri="{28A0092B-C50C-407E-A947-70E740481C1C}">
+                  <a14:useLocalDpi xmlns:a14="http://schemas.microsoft.com/office/drawing/2010/main" val="0"/>
+                </a:ext>
+              </a:extLst>
+            </a:blip>
+            <a:srcRect l="44584" t="63267" r="34748"/>
+            <a:stretch/>
+          </p:blipFill>
+          <p:spPr>
+            <a:xfrm rot="3709910">
+              <a:off x="4579769" y="3525264"/>
+              <a:ext cx="992038" cy="1322372"/>
+            </a:xfrm>
+            <a:prstGeom prst="rect">
+              <a:avLst/>
+            </a:prstGeom>
+          </p:spPr>
+        </p:pic>
+      </p:grpSp>
+      <p:pic>
+        <p:nvPicPr>
+          <p:cNvPr id="8" name="Picture 7"/>
+          <p:cNvPicPr>
+            <a:picLocks noChangeAspect="1"/>
+          </p:cNvPicPr>
+          <p:nvPr/>
+        </p:nvPicPr>
+        <p:blipFill rotWithShape="1">
+          <a:blip r:embed="rId4">
+            <a:extLst>
+              <a:ext uri="{28A0092B-C50C-407E-A947-70E740481C1C}">
+                <a14:useLocalDpi xmlns:a14="http://schemas.microsoft.com/office/drawing/2010/main" val="0"/>
+              </a:ext>
+            </a:extLst>
+          </a:blip>
+          <a:srcRect l="13266" t="24544" r="22547" b="6470"/>
+          <a:stretch/>
+        </p:blipFill>
+        <p:spPr>
+          <a:xfrm>
+            <a:off x="4476565" y="2389517"/>
+            <a:ext cx="2700068" cy="2700068"/>
+          </a:xfrm>
+          <a:prstGeom prst="rect">
+            <a:avLst/>
+          </a:prstGeom>
+        </p:spPr>
+      </p:pic>
+    </p:spTree>
+    <p:extLst>
+      <p:ext uri="{BB962C8B-B14F-4D97-AF65-F5344CB8AC3E}">
+        <p14:creationId xmlns:p14="http://schemas.microsoft.com/office/powerpoint/2010/main" val="3030903875"/>
       </p:ext>
     </p:extLst>
   </p:cSld>

</xml_diff>

<commit_message>
Added Viruses and other graphical interfaces and also added collision Detection
</commit_message>
<xml_diff>
--- a/Characters.pptx
+++ b/Characters.pptx
@@ -10,6 +10,9 @@
     <p:sldId id="258" r:id="rId4"/>
     <p:sldId id="259" r:id="rId5"/>
     <p:sldId id="260" r:id="rId6"/>
+    <p:sldId id="261" r:id="rId7"/>
+    <p:sldId id="262" r:id="rId8"/>
+    <p:sldId id="263" r:id="rId9"/>
   </p:sldIdLst>
   <p:sldSz cx="12192000" cy="6858000"/>
   <p:notesSz cx="6858000" cy="9144000"/>
@@ -3504,7 +3507,11 @@
           <a:p>
             <a:r>
               <a:rPr lang="en-IN" dirty="0" smtClean="0"/>
-              <a:t>Raccoon: Jumping</a:t>
+              <a:t>Raccoon: </a:t>
+            </a:r>
+            <a:r>
+              <a:rPr lang="en-IN" dirty="0" smtClean="0"/>
+              <a:t>Dodging</a:t>
             </a:r>
             <a:endParaRPr lang="en-US" dirty="0"/>
           </a:p>
@@ -3702,6 +3709,705 @@
     <p:extLst>
       <p:ext uri="{BB962C8B-B14F-4D97-AF65-F5344CB8AC3E}">
         <p14:creationId xmlns:p14="http://schemas.microsoft.com/office/powerpoint/2010/main" val="3240682208"/>
+      </p:ext>
+    </p:extLst>
+  </p:cSld>
+  <p:clrMapOvr>
+    <a:masterClrMapping/>
+  </p:clrMapOvr>
+</p:sld>
+</file>
+
+<file path=ppt/slides/slide6.xml><?xml version="1.0" encoding="utf-8"?>
+<p:sld xmlns:a="http://schemas.openxmlformats.org/drawingml/2006/main" xmlns:r="http://schemas.openxmlformats.org/officeDocument/2006/relationships" xmlns:p="http://schemas.openxmlformats.org/presentationml/2006/main">
+  <p:cSld>
+    <p:spTree>
+      <p:nvGrpSpPr>
+        <p:cNvPr id="1" name=""/>
+        <p:cNvGrpSpPr/>
+        <p:nvPr/>
+      </p:nvGrpSpPr>
+      <p:grpSpPr>
+        <a:xfrm>
+          <a:off x="0" y="0"/>
+          <a:ext cx="0" cy="0"/>
+          <a:chOff x="0" y="0"/>
+          <a:chExt cx="0" cy="0"/>
+        </a:xfrm>
+      </p:grpSpPr>
+      <p:sp>
+        <p:nvSpPr>
+          <p:cNvPr id="2" name="Title 1"/>
+          <p:cNvSpPr>
+            <a:spLocks noGrp="1"/>
+          </p:cNvSpPr>
+          <p:nvPr>
+            <p:ph type="title"/>
+          </p:nvPr>
+        </p:nvSpPr>
+        <p:spPr/>
+        <p:txBody>
+          <a:bodyPr/>
+          <a:lstStyle/>
+          <a:p>
+            <a:r>
+              <a:rPr lang="en-IN" dirty="0" smtClean="0"/>
+              <a:t>City</a:t>
+            </a:r>
+            <a:endParaRPr lang="en-US" dirty="0"/>
+          </a:p>
+        </p:txBody>
+      </p:sp>
+      <p:grpSp>
+        <p:nvGrpSpPr>
+          <p:cNvPr id="24" name="Group 23"/>
+          <p:cNvGrpSpPr/>
+          <p:nvPr/>
+        </p:nvGrpSpPr>
+        <p:grpSpPr>
+          <a:xfrm>
+            <a:off x="0" y="1690688"/>
+            <a:ext cx="6480000" cy="4320000"/>
+            <a:chOff x="0" y="1690688"/>
+            <a:chExt cx="6480000" cy="4320000"/>
+          </a:xfrm>
+        </p:grpSpPr>
+        <p:sp>
+          <p:nvSpPr>
+            <p:cNvPr id="8" name="Rectangle 7"/>
+            <p:cNvSpPr/>
+            <p:nvPr/>
+          </p:nvSpPr>
+          <p:spPr>
+            <a:xfrm>
+              <a:off x="0" y="1690688"/>
+              <a:ext cx="6480000" cy="4320000"/>
+            </a:xfrm>
+            <a:prstGeom prst="rect">
+              <a:avLst/>
+            </a:prstGeom>
+            <a:blipFill dpi="0" rotWithShape="1">
+              <a:blip r:embed="rId2">
+                <a:extLst>
+                  <a:ext uri="{28A0092B-C50C-407E-A947-70E740481C1C}">
+                    <a14:useLocalDpi xmlns:a14="http://schemas.microsoft.com/office/drawing/2010/main" val="0"/>
+                  </a:ext>
+                </a:extLst>
+              </a:blip>
+              <a:srcRect/>
+              <a:stretch>
+                <a:fillRect/>
+              </a:stretch>
+            </a:blipFill>
+          </p:spPr>
+          <p:style>
+            <a:lnRef idx="2">
+              <a:schemeClr val="accent1">
+                <a:shade val="50000"/>
+              </a:schemeClr>
+            </a:lnRef>
+            <a:fillRef idx="1">
+              <a:schemeClr val="accent1"/>
+            </a:fillRef>
+            <a:effectRef idx="0">
+              <a:schemeClr val="accent1"/>
+            </a:effectRef>
+            <a:fontRef idx="minor">
+              <a:schemeClr val="lt1"/>
+            </a:fontRef>
+          </p:style>
+          <p:txBody>
+            <a:bodyPr rtlCol="0" anchor="ctr"/>
+            <a:lstStyle/>
+            <a:p>
+              <a:pPr algn="ctr"/>
+              <a:endParaRPr lang="en-US"/>
+            </a:p>
+          </p:txBody>
+        </p:sp>
+        <p:sp>
+          <p:nvSpPr>
+            <p:cNvPr id="15" name="Rectangle 14"/>
+            <p:cNvSpPr/>
+            <p:nvPr/>
+          </p:nvSpPr>
+          <p:spPr>
+            <a:xfrm>
+              <a:off x="2055012" y="1690688"/>
+              <a:ext cx="2369975" cy="606490"/>
+            </a:xfrm>
+            <a:prstGeom prst="rect">
+              <a:avLst/>
+            </a:prstGeom>
+            <a:ln/>
+            <a:effectLst>
+              <a:softEdge rad="63500"/>
+            </a:effectLst>
+          </p:spPr>
+          <p:style>
+            <a:lnRef idx="3">
+              <a:schemeClr val="lt1"/>
+            </a:lnRef>
+            <a:fillRef idx="1">
+              <a:schemeClr val="accent1"/>
+            </a:fillRef>
+            <a:effectRef idx="1">
+              <a:schemeClr val="accent1"/>
+            </a:effectRef>
+            <a:fontRef idx="minor">
+              <a:schemeClr val="lt1"/>
+            </a:fontRef>
+          </p:style>
+          <p:txBody>
+            <a:bodyPr rtlCol="0" anchor="ctr"/>
+            <a:lstStyle/>
+            <a:p>
+              <a:pPr algn="ctr"/>
+              <a:r>
+                <a:rPr lang="en-IN" b="1" dirty="0" smtClean="0">
+                  <a:latin typeface="Arial Black" panose="020B0A04020102020204" pitchFamily="34" charset="0"/>
+                  <a:ea typeface="Adobe Ming Std L" panose="02020300000000000000" pitchFamily="18" charset="-128"/>
+                </a:rPr>
+                <a:t>COVID RACCOON</a:t>
+              </a:r>
+              <a:endParaRPr lang="en-US" b="1" dirty="0">
+                <a:latin typeface="Arial Black" panose="020B0A04020102020204" pitchFamily="34" charset="0"/>
+                <a:ea typeface="Adobe Ming Std L" panose="02020300000000000000" pitchFamily="18" charset="-128"/>
+              </a:endParaRPr>
+            </a:p>
+          </p:txBody>
+        </p:sp>
+        <p:pic>
+          <p:nvPicPr>
+            <p:cNvPr id="18" name="Picture 17"/>
+            <p:cNvPicPr>
+              <a:picLocks noChangeAspect="1"/>
+            </p:cNvPicPr>
+            <p:nvPr/>
+          </p:nvPicPr>
+          <p:blipFill>
+            <a:blip r:embed="rId3">
+              <a:extLst>
+                <a:ext uri="{28A0092B-C50C-407E-A947-70E740481C1C}">
+                  <a14:useLocalDpi xmlns:a14="http://schemas.microsoft.com/office/drawing/2010/main" val="0"/>
+                </a:ext>
+              </a:extLst>
+            </a:blip>
+            <a:stretch>
+              <a:fillRect/>
+            </a:stretch>
+          </p:blipFill>
+          <p:spPr>
+            <a:xfrm>
+              <a:off x="6120304" y="1789565"/>
+              <a:ext cx="359695" cy="597460"/>
+            </a:xfrm>
+            <a:prstGeom prst="rect">
+              <a:avLst/>
+            </a:prstGeom>
+          </p:spPr>
+        </p:pic>
+        <p:pic>
+          <p:nvPicPr>
+            <p:cNvPr id="22" name="Picture 21"/>
+            <p:cNvPicPr>
+              <a:picLocks noChangeAspect="1"/>
+            </p:cNvPicPr>
+            <p:nvPr/>
+          </p:nvPicPr>
+          <p:blipFill>
+            <a:blip r:embed="rId3">
+              <a:extLst>
+                <a:ext uri="{28A0092B-C50C-407E-A947-70E740481C1C}">
+                  <a14:useLocalDpi xmlns:a14="http://schemas.microsoft.com/office/drawing/2010/main" val="0"/>
+                </a:ext>
+              </a:extLst>
+            </a:blip>
+            <a:stretch>
+              <a:fillRect/>
+            </a:stretch>
+          </p:blipFill>
+          <p:spPr>
+            <a:xfrm>
+              <a:off x="5760608" y="1789565"/>
+              <a:ext cx="359695" cy="597460"/>
+            </a:xfrm>
+            <a:prstGeom prst="rect">
+              <a:avLst/>
+            </a:prstGeom>
+          </p:spPr>
+        </p:pic>
+        <p:pic>
+          <p:nvPicPr>
+            <p:cNvPr id="23" name="Picture 22"/>
+            <p:cNvPicPr>
+              <a:picLocks noChangeAspect="1"/>
+            </p:cNvPicPr>
+            <p:nvPr/>
+          </p:nvPicPr>
+          <p:blipFill>
+            <a:blip r:embed="rId3">
+              <a:extLst>
+                <a:ext uri="{28A0092B-C50C-407E-A947-70E740481C1C}">
+                  <a14:useLocalDpi xmlns:a14="http://schemas.microsoft.com/office/drawing/2010/main" val="0"/>
+                </a:ext>
+              </a:extLst>
+            </a:blip>
+            <a:stretch>
+              <a:fillRect/>
+            </a:stretch>
+          </p:blipFill>
+          <p:spPr>
+            <a:xfrm>
+              <a:off x="5400912" y="1789565"/>
+              <a:ext cx="359695" cy="597460"/>
+            </a:xfrm>
+            <a:prstGeom prst="rect">
+              <a:avLst/>
+            </a:prstGeom>
+          </p:spPr>
+        </p:pic>
+      </p:grpSp>
+    </p:spTree>
+    <p:extLst>
+      <p:ext uri="{BB962C8B-B14F-4D97-AF65-F5344CB8AC3E}">
+        <p14:creationId xmlns:p14="http://schemas.microsoft.com/office/powerpoint/2010/main" val="1389062533"/>
+      </p:ext>
+    </p:extLst>
+  </p:cSld>
+  <p:clrMapOvr>
+    <a:masterClrMapping/>
+  </p:clrMapOvr>
+</p:sld>
+</file>
+
+<file path=ppt/slides/slide7.xml><?xml version="1.0" encoding="utf-8"?>
+<p:sld xmlns:a="http://schemas.openxmlformats.org/drawingml/2006/main" xmlns:r="http://schemas.openxmlformats.org/officeDocument/2006/relationships" xmlns:p="http://schemas.openxmlformats.org/presentationml/2006/main">
+  <p:cSld>
+    <p:spTree>
+      <p:nvGrpSpPr>
+        <p:cNvPr id="1" name=""/>
+        <p:cNvGrpSpPr/>
+        <p:nvPr/>
+      </p:nvGrpSpPr>
+      <p:grpSpPr>
+        <a:xfrm>
+          <a:off x="0" y="0"/>
+          <a:ext cx="0" cy="0"/>
+          <a:chOff x="0" y="0"/>
+          <a:chExt cx="0" cy="0"/>
+        </a:xfrm>
+      </p:grpSpPr>
+      <p:sp>
+        <p:nvSpPr>
+          <p:cNvPr id="2" name="Title 1"/>
+          <p:cNvSpPr>
+            <a:spLocks noGrp="1"/>
+          </p:cNvSpPr>
+          <p:nvPr>
+            <p:ph type="title"/>
+          </p:nvPr>
+        </p:nvSpPr>
+        <p:spPr/>
+        <p:txBody>
+          <a:bodyPr/>
+          <a:lstStyle/>
+          <a:p>
+            <a:r>
+              <a:rPr lang="en-IN" dirty="0" smtClean="0"/>
+              <a:t>City</a:t>
+            </a:r>
+            <a:endParaRPr lang="en-US" dirty="0"/>
+          </a:p>
+        </p:txBody>
+      </p:sp>
+      <p:grpSp>
+        <p:nvGrpSpPr>
+          <p:cNvPr id="3" name="Group 2"/>
+          <p:cNvGrpSpPr/>
+          <p:nvPr/>
+        </p:nvGrpSpPr>
+        <p:grpSpPr>
+          <a:xfrm>
+            <a:off x="0" y="1690688"/>
+            <a:ext cx="6480000" cy="4320000"/>
+            <a:chOff x="0" y="1690688"/>
+            <a:chExt cx="6480000" cy="4320000"/>
+          </a:xfrm>
+        </p:grpSpPr>
+        <p:sp>
+          <p:nvSpPr>
+            <p:cNvPr id="8" name="Rectangle 7"/>
+            <p:cNvSpPr/>
+            <p:nvPr/>
+          </p:nvSpPr>
+          <p:spPr>
+            <a:xfrm>
+              <a:off x="0" y="1690688"/>
+              <a:ext cx="6480000" cy="4320000"/>
+            </a:xfrm>
+            <a:prstGeom prst="rect">
+              <a:avLst/>
+            </a:prstGeom>
+            <a:blipFill dpi="0" rotWithShape="1">
+              <a:blip r:embed="rId2">
+                <a:extLst>
+                  <a:ext uri="{28A0092B-C50C-407E-A947-70E740481C1C}">
+                    <a14:useLocalDpi xmlns:a14="http://schemas.microsoft.com/office/drawing/2010/main" val="0"/>
+                  </a:ext>
+                </a:extLst>
+              </a:blip>
+              <a:srcRect/>
+              <a:stretch>
+                <a:fillRect/>
+              </a:stretch>
+            </a:blipFill>
+          </p:spPr>
+          <p:style>
+            <a:lnRef idx="2">
+              <a:schemeClr val="accent1">
+                <a:shade val="50000"/>
+              </a:schemeClr>
+            </a:lnRef>
+            <a:fillRef idx="1">
+              <a:schemeClr val="accent1"/>
+            </a:fillRef>
+            <a:effectRef idx="0">
+              <a:schemeClr val="accent1"/>
+            </a:effectRef>
+            <a:fontRef idx="minor">
+              <a:schemeClr val="lt1"/>
+            </a:fontRef>
+          </p:style>
+          <p:txBody>
+            <a:bodyPr rtlCol="0" anchor="ctr"/>
+            <a:lstStyle/>
+            <a:p>
+              <a:pPr algn="ctr"/>
+              <a:endParaRPr lang="en-US"/>
+            </a:p>
+          </p:txBody>
+        </p:sp>
+        <p:sp>
+          <p:nvSpPr>
+            <p:cNvPr id="15" name="Rectangle 14"/>
+            <p:cNvSpPr/>
+            <p:nvPr/>
+          </p:nvSpPr>
+          <p:spPr>
+            <a:xfrm>
+              <a:off x="2055012" y="1690688"/>
+              <a:ext cx="2369975" cy="606490"/>
+            </a:xfrm>
+            <a:prstGeom prst="rect">
+              <a:avLst/>
+            </a:prstGeom>
+            <a:ln/>
+            <a:effectLst>
+              <a:softEdge rad="63500"/>
+            </a:effectLst>
+          </p:spPr>
+          <p:style>
+            <a:lnRef idx="3">
+              <a:schemeClr val="lt1"/>
+            </a:lnRef>
+            <a:fillRef idx="1">
+              <a:schemeClr val="accent1"/>
+            </a:fillRef>
+            <a:effectRef idx="1">
+              <a:schemeClr val="accent1"/>
+            </a:effectRef>
+            <a:fontRef idx="minor">
+              <a:schemeClr val="lt1"/>
+            </a:fontRef>
+          </p:style>
+          <p:txBody>
+            <a:bodyPr rtlCol="0" anchor="ctr"/>
+            <a:lstStyle/>
+            <a:p>
+              <a:pPr algn="ctr"/>
+              <a:r>
+                <a:rPr lang="en-IN" b="1" dirty="0" smtClean="0">
+                  <a:latin typeface="Arial Black" panose="020B0A04020102020204" pitchFamily="34" charset="0"/>
+                  <a:ea typeface="Adobe Ming Std L" panose="02020300000000000000" pitchFamily="18" charset="-128"/>
+                </a:rPr>
+                <a:t>COVID RACCOON</a:t>
+              </a:r>
+              <a:endParaRPr lang="en-US" b="1" dirty="0">
+                <a:latin typeface="Arial Black" panose="020B0A04020102020204" pitchFamily="34" charset="0"/>
+                <a:ea typeface="Adobe Ming Std L" panose="02020300000000000000" pitchFamily="18" charset="-128"/>
+              </a:endParaRPr>
+            </a:p>
+          </p:txBody>
+        </p:sp>
+        <p:pic>
+          <p:nvPicPr>
+            <p:cNvPr id="18" name="Picture 17"/>
+            <p:cNvPicPr>
+              <a:picLocks noChangeAspect="1"/>
+            </p:cNvPicPr>
+            <p:nvPr/>
+          </p:nvPicPr>
+          <p:blipFill>
+            <a:blip r:embed="rId3">
+              <a:extLst>
+                <a:ext uri="{28A0092B-C50C-407E-A947-70E740481C1C}">
+                  <a14:useLocalDpi xmlns:a14="http://schemas.microsoft.com/office/drawing/2010/main" val="0"/>
+                </a:ext>
+              </a:extLst>
+            </a:blip>
+            <a:stretch>
+              <a:fillRect/>
+            </a:stretch>
+          </p:blipFill>
+          <p:spPr>
+            <a:xfrm>
+              <a:off x="6120304" y="1789565"/>
+              <a:ext cx="359695" cy="597460"/>
+            </a:xfrm>
+            <a:prstGeom prst="rect">
+              <a:avLst/>
+            </a:prstGeom>
+          </p:spPr>
+        </p:pic>
+        <p:pic>
+          <p:nvPicPr>
+            <p:cNvPr id="22" name="Picture 21"/>
+            <p:cNvPicPr>
+              <a:picLocks noChangeAspect="1"/>
+            </p:cNvPicPr>
+            <p:nvPr/>
+          </p:nvPicPr>
+          <p:blipFill>
+            <a:blip r:embed="rId3">
+              <a:extLst>
+                <a:ext uri="{28A0092B-C50C-407E-A947-70E740481C1C}">
+                  <a14:useLocalDpi xmlns:a14="http://schemas.microsoft.com/office/drawing/2010/main" val="0"/>
+                </a:ext>
+              </a:extLst>
+            </a:blip>
+            <a:stretch>
+              <a:fillRect/>
+            </a:stretch>
+          </p:blipFill>
+          <p:spPr>
+            <a:xfrm>
+              <a:off x="5760608" y="1789565"/>
+              <a:ext cx="359695" cy="597460"/>
+            </a:xfrm>
+            <a:prstGeom prst="rect">
+              <a:avLst/>
+            </a:prstGeom>
+          </p:spPr>
+        </p:pic>
+      </p:grpSp>
+    </p:spTree>
+    <p:extLst>
+      <p:ext uri="{BB962C8B-B14F-4D97-AF65-F5344CB8AC3E}">
+        <p14:creationId xmlns:p14="http://schemas.microsoft.com/office/powerpoint/2010/main" val="1630358068"/>
+      </p:ext>
+    </p:extLst>
+  </p:cSld>
+  <p:clrMapOvr>
+    <a:masterClrMapping/>
+  </p:clrMapOvr>
+</p:sld>
+</file>
+
+<file path=ppt/slides/slide8.xml><?xml version="1.0" encoding="utf-8"?>
+<p:sld xmlns:a="http://schemas.openxmlformats.org/drawingml/2006/main" xmlns:r="http://schemas.openxmlformats.org/officeDocument/2006/relationships" xmlns:p="http://schemas.openxmlformats.org/presentationml/2006/main">
+  <p:cSld>
+    <p:spTree>
+      <p:nvGrpSpPr>
+        <p:cNvPr id="1" name=""/>
+        <p:cNvGrpSpPr/>
+        <p:nvPr/>
+      </p:nvGrpSpPr>
+      <p:grpSpPr>
+        <a:xfrm>
+          <a:off x="0" y="0"/>
+          <a:ext cx="0" cy="0"/>
+          <a:chOff x="0" y="0"/>
+          <a:chExt cx="0" cy="0"/>
+        </a:xfrm>
+      </p:grpSpPr>
+      <p:sp>
+        <p:nvSpPr>
+          <p:cNvPr id="2" name="Title 1"/>
+          <p:cNvSpPr>
+            <a:spLocks noGrp="1"/>
+          </p:cNvSpPr>
+          <p:nvPr>
+            <p:ph type="title"/>
+          </p:nvPr>
+        </p:nvSpPr>
+        <p:spPr/>
+        <p:txBody>
+          <a:bodyPr/>
+          <a:lstStyle/>
+          <a:p>
+            <a:r>
+              <a:rPr lang="en-IN" dirty="0" smtClean="0"/>
+              <a:t>City</a:t>
+            </a:r>
+            <a:endParaRPr lang="en-US" dirty="0"/>
+          </a:p>
+        </p:txBody>
+      </p:sp>
+      <p:grpSp>
+        <p:nvGrpSpPr>
+          <p:cNvPr id="3" name="Group 2"/>
+          <p:cNvGrpSpPr/>
+          <p:nvPr/>
+        </p:nvGrpSpPr>
+        <p:grpSpPr>
+          <a:xfrm>
+            <a:off x="0" y="1690688"/>
+            <a:ext cx="6480000" cy="4320000"/>
+            <a:chOff x="0" y="1690688"/>
+            <a:chExt cx="6480000" cy="4320000"/>
+          </a:xfrm>
+        </p:grpSpPr>
+        <p:sp>
+          <p:nvSpPr>
+            <p:cNvPr id="8" name="Rectangle 7"/>
+            <p:cNvSpPr/>
+            <p:nvPr/>
+          </p:nvSpPr>
+          <p:spPr>
+            <a:xfrm>
+              <a:off x="0" y="1690688"/>
+              <a:ext cx="6480000" cy="4320000"/>
+            </a:xfrm>
+            <a:prstGeom prst="rect">
+              <a:avLst/>
+            </a:prstGeom>
+            <a:blipFill dpi="0" rotWithShape="1">
+              <a:blip r:embed="rId2">
+                <a:extLst>
+                  <a:ext uri="{28A0092B-C50C-407E-A947-70E740481C1C}">
+                    <a14:useLocalDpi xmlns:a14="http://schemas.microsoft.com/office/drawing/2010/main" val="0"/>
+                  </a:ext>
+                </a:extLst>
+              </a:blip>
+              <a:srcRect/>
+              <a:stretch>
+                <a:fillRect/>
+              </a:stretch>
+            </a:blipFill>
+          </p:spPr>
+          <p:style>
+            <a:lnRef idx="2">
+              <a:schemeClr val="accent1">
+                <a:shade val="50000"/>
+              </a:schemeClr>
+            </a:lnRef>
+            <a:fillRef idx="1">
+              <a:schemeClr val="accent1"/>
+            </a:fillRef>
+            <a:effectRef idx="0">
+              <a:schemeClr val="accent1"/>
+            </a:effectRef>
+            <a:fontRef idx="minor">
+              <a:schemeClr val="lt1"/>
+            </a:fontRef>
+          </p:style>
+          <p:txBody>
+            <a:bodyPr rtlCol="0" anchor="ctr"/>
+            <a:lstStyle/>
+            <a:p>
+              <a:pPr algn="ctr"/>
+              <a:endParaRPr lang="en-US"/>
+            </a:p>
+          </p:txBody>
+        </p:sp>
+        <p:sp>
+          <p:nvSpPr>
+            <p:cNvPr id="15" name="Rectangle 14"/>
+            <p:cNvSpPr/>
+            <p:nvPr/>
+          </p:nvSpPr>
+          <p:spPr>
+            <a:xfrm>
+              <a:off x="2055012" y="1690688"/>
+              <a:ext cx="2369975" cy="606490"/>
+            </a:xfrm>
+            <a:prstGeom prst="rect">
+              <a:avLst/>
+            </a:prstGeom>
+            <a:ln/>
+            <a:effectLst>
+              <a:softEdge rad="63500"/>
+            </a:effectLst>
+          </p:spPr>
+          <p:style>
+            <a:lnRef idx="3">
+              <a:schemeClr val="lt1"/>
+            </a:lnRef>
+            <a:fillRef idx="1">
+              <a:schemeClr val="accent1"/>
+            </a:fillRef>
+            <a:effectRef idx="1">
+              <a:schemeClr val="accent1"/>
+            </a:effectRef>
+            <a:fontRef idx="minor">
+              <a:schemeClr val="lt1"/>
+            </a:fontRef>
+          </p:style>
+          <p:txBody>
+            <a:bodyPr rtlCol="0" anchor="ctr"/>
+            <a:lstStyle/>
+            <a:p>
+              <a:pPr algn="ctr"/>
+              <a:r>
+                <a:rPr lang="en-IN" b="1" dirty="0" smtClean="0">
+                  <a:latin typeface="Arial Black" panose="020B0A04020102020204" pitchFamily="34" charset="0"/>
+                  <a:ea typeface="Adobe Ming Std L" panose="02020300000000000000" pitchFamily="18" charset="-128"/>
+                </a:rPr>
+                <a:t>COVID RACCOON</a:t>
+              </a:r>
+              <a:endParaRPr lang="en-US" b="1" dirty="0">
+                <a:latin typeface="Arial Black" panose="020B0A04020102020204" pitchFamily="34" charset="0"/>
+                <a:ea typeface="Adobe Ming Std L" panose="02020300000000000000" pitchFamily="18" charset="-128"/>
+              </a:endParaRPr>
+            </a:p>
+          </p:txBody>
+        </p:sp>
+        <p:pic>
+          <p:nvPicPr>
+            <p:cNvPr id="18" name="Picture 17"/>
+            <p:cNvPicPr>
+              <a:picLocks noChangeAspect="1"/>
+            </p:cNvPicPr>
+            <p:nvPr/>
+          </p:nvPicPr>
+          <p:blipFill>
+            <a:blip r:embed="rId3">
+              <a:extLst>
+                <a:ext uri="{28A0092B-C50C-407E-A947-70E740481C1C}">
+                  <a14:useLocalDpi xmlns:a14="http://schemas.microsoft.com/office/drawing/2010/main" val="0"/>
+                </a:ext>
+              </a:extLst>
+            </a:blip>
+            <a:stretch>
+              <a:fillRect/>
+            </a:stretch>
+          </p:blipFill>
+          <p:spPr>
+            <a:xfrm>
+              <a:off x="6120304" y="1789565"/>
+              <a:ext cx="359695" cy="597460"/>
+            </a:xfrm>
+            <a:prstGeom prst="rect">
+              <a:avLst/>
+            </a:prstGeom>
+          </p:spPr>
+        </p:pic>
+      </p:grpSp>
+    </p:spTree>
+    <p:extLst>
+      <p:ext uri="{BB962C8B-B14F-4D97-AF65-F5344CB8AC3E}">
+        <p14:creationId xmlns:p14="http://schemas.microsoft.com/office/powerpoint/2010/main" val="4287676511"/>
       </p:ext>
     </p:extLst>
   </p:cSld>

</xml_diff>

<commit_message>
Jump and Dodge features added to the Game
</commit_message>
<xml_diff>
--- a/Characters.pptx
+++ b/Characters.pptx
@@ -10,9 +10,10 @@
     <p:sldId id="258" r:id="rId4"/>
     <p:sldId id="259" r:id="rId5"/>
     <p:sldId id="260" r:id="rId6"/>
-    <p:sldId id="261" r:id="rId7"/>
-    <p:sldId id="262" r:id="rId8"/>
-    <p:sldId id="263" r:id="rId9"/>
+    <p:sldId id="264" r:id="rId7"/>
+    <p:sldId id="261" r:id="rId8"/>
+    <p:sldId id="262" r:id="rId9"/>
+    <p:sldId id="263" r:id="rId10"/>
   </p:sldIdLst>
   <p:sldSz cx="12192000" cy="6858000"/>
   <p:notesSz cx="6858000" cy="9144000"/>
@@ -3507,11 +3508,7 @@
           <a:p>
             <a:r>
               <a:rPr lang="en-IN" dirty="0" smtClean="0"/>
-              <a:t>Raccoon: </a:t>
-            </a:r>
-            <a:r>
-              <a:rPr lang="en-IN" dirty="0" smtClean="0"/>
-              <a:t>Dodging</a:t>
+              <a:t>Raccoon: Dodging</a:t>
             </a:r>
             <a:endParaRPr lang="en-US" dirty="0"/>
           </a:p>
@@ -3719,6 +3716,88 @@
 </file>
 
 <file path=ppt/slides/slide6.xml><?xml version="1.0" encoding="utf-8"?>
+<p:sld xmlns:a="http://schemas.openxmlformats.org/drawingml/2006/main" xmlns:r="http://schemas.openxmlformats.org/officeDocument/2006/relationships" xmlns:p="http://schemas.openxmlformats.org/presentationml/2006/main">
+  <p:cSld>
+    <p:spTree>
+      <p:nvGrpSpPr>
+        <p:cNvPr id="1" name=""/>
+        <p:cNvGrpSpPr/>
+        <p:nvPr/>
+      </p:nvGrpSpPr>
+      <p:grpSpPr>
+        <a:xfrm>
+          <a:off x="0" y="0"/>
+          <a:ext cx="0" cy="0"/>
+          <a:chOff x="0" y="0"/>
+          <a:chExt cx="0" cy="0"/>
+        </a:xfrm>
+      </p:grpSpPr>
+      <p:sp>
+        <p:nvSpPr>
+          <p:cNvPr id="2" name="Title 1"/>
+          <p:cNvSpPr>
+            <a:spLocks noGrp="1"/>
+          </p:cNvSpPr>
+          <p:nvPr>
+            <p:ph type="title"/>
+          </p:nvPr>
+        </p:nvSpPr>
+        <p:spPr/>
+        <p:txBody>
+          <a:bodyPr/>
+          <a:lstStyle/>
+          <a:p>
+            <a:r>
+              <a:rPr lang="en-IN" dirty="0" smtClean="0"/>
+              <a:t>Raccoon: Dodging</a:t>
+            </a:r>
+            <a:endParaRPr lang="en-US" dirty="0"/>
+          </a:p>
+        </p:txBody>
+      </p:sp>
+      <p:pic>
+        <p:nvPicPr>
+          <p:cNvPr id="7" name="Picture 6"/>
+          <p:cNvPicPr>
+            <a:picLocks noChangeAspect="1"/>
+          </p:cNvPicPr>
+          <p:nvPr/>
+        </p:nvPicPr>
+        <p:blipFill rotWithShape="1">
+          <a:blip r:embed="rId2" cstate="print">
+            <a:extLst>
+              <a:ext uri="{28A0092B-C50C-407E-A947-70E740481C1C}">
+                <a14:useLocalDpi xmlns:a14="http://schemas.microsoft.com/office/drawing/2010/main" val="0"/>
+              </a:ext>
+            </a:extLst>
+          </a:blip>
+          <a:srcRect l="6226" t="7734" r="17694" b="14868"/>
+          <a:stretch/>
+        </p:blipFill>
+        <p:spPr>
+          <a:xfrm>
+            <a:off x="4267200" y="2932981"/>
+            <a:ext cx="1670560" cy="1207698"/>
+          </a:xfrm>
+          <a:prstGeom prst="rect">
+            <a:avLst/>
+          </a:prstGeom>
+        </p:spPr>
+      </p:pic>
+    </p:spTree>
+    <p:extLst>
+      <p:ext uri="{BB962C8B-B14F-4D97-AF65-F5344CB8AC3E}">
+        <p14:creationId xmlns:p14="http://schemas.microsoft.com/office/powerpoint/2010/main" val="703435940"/>
+      </p:ext>
+    </p:extLst>
+  </p:cSld>
+  <p:clrMapOvr>
+    <a:masterClrMapping/>
+  </p:clrMapOvr>
+</p:sld>
+</file>
+
+<file path=ppt/slides/slide7.xml><?xml version="1.0" encoding="utf-8"?>
 <p:sld xmlns:a="http://schemas.openxmlformats.org/drawingml/2006/main" xmlns:r="http://schemas.openxmlformats.org/officeDocument/2006/relationships" xmlns:p="http://schemas.openxmlformats.org/presentationml/2006/main">
   <p:cSld>
     <p:spTree>
@@ -3981,7 +4060,7 @@
 </p:sld>
 </file>
 
-<file path=ppt/slides/slide7.xml><?xml version="1.0" encoding="utf-8"?>
+<file path=ppt/slides/slide8.xml><?xml version="1.0" encoding="utf-8"?>
 <p:sld xmlns:a="http://schemas.openxmlformats.org/drawingml/2006/main" xmlns:r="http://schemas.openxmlformats.org/officeDocument/2006/relationships" xmlns:p="http://schemas.openxmlformats.org/presentationml/2006/main">
   <p:cSld>
     <p:spTree>
@@ -4214,7 +4293,7 @@
 </p:sld>
 </file>
 
-<file path=ppt/slides/slide8.xml><?xml version="1.0" encoding="utf-8"?>
+<file path=ppt/slides/slide9.xml><?xml version="1.0" encoding="utf-8"?>
 <p:sld xmlns:a="http://schemas.openxmlformats.org/drawingml/2006/main" xmlns:r="http://schemas.openxmlformats.org/officeDocument/2006/relationships" xmlns:p="http://schemas.openxmlformats.org/presentationml/2006/main">
   <p:cSld>
     <p:spTree>

</xml_diff>